<commit_message>
Demasiados cambios para describirlos
</commit_message>
<xml_diff>
--- a/docs/layout-wireframe-design.pptx
+++ b/docs/layout-wireframe-design.pptx
@@ -111,6 +111,11 @@
       </a:defRPr>
     </a:lvl9pPr>
   </p:defaultTextStyle>
+  <p:extLst>
+    <p:ext uri="{EFAFB233-063F-42B5-8137-9DF3F51BA10A}">
+      <p15:sldGuideLst xmlns:p15="http://schemas.microsoft.com/office/powerpoint/2012/main"/>
+    </p:ext>
+  </p:extLst>
 </p:presentation>
 </file>
 
@@ -263,7 +268,7 @@
           <a:p>
             <a:fld id="{68FBEF3B-CA59-452C-8053-90FEF0AFFC91}" type="datetimeFigureOut">
               <a:rPr lang="es-ES" smtClean="0"/>
-              <a:t>05/11/2022</a:t>
+              <a:t>21/11/2022</a:t>
             </a:fld>
             <a:endParaRPr lang="es-ES"/>
           </a:p>
@@ -463,7 +468,7 @@
           <a:p>
             <a:fld id="{68FBEF3B-CA59-452C-8053-90FEF0AFFC91}" type="datetimeFigureOut">
               <a:rPr lang="es-ES" smtClean="0"/>
-              <a:t>05/11/2022</a:t>
+              <a:t>21/11/2022</a:t>
             </a:fld>
             <a:endParaRPr lang="es-ES"/>
           </a:p>
@@ -673,7 +678,7 @@
           <a:p>
             <a:fld id="{68FBEF3B-CA59-452C-8053-90FEF0AFFC91}" type="datetimeFigureOut">
               <a:rPr lang="es-ES" smtClean="0"/>
-              <a:t>05/11/2022</a:t>
+              <a:t>21/11/2022</a:t>
             </a:fld>
             <a:endParaRPr lang="es-ES"/>
           </a:p>
@@ -873,7 +878,7 @@
           <a:p>
             <a:fld id="{68FBEF3B-CA59-452C-8053-90FEF0AFFC91}" type="datetimeFigureOut">
               <a:rPr lang="es-ES" smtClean="0"/>
-              <a:t>05/11/2022</a:t>
+              <a:t>21/11/2022</a:t>
             </a:fld>
             <a:endParaRPr lang="es-ES"/>
           </a:p>
@@ -1149,7 +1154,7 @@
           <a:p>
             <a:fld id="{68FBEF3B-CA59-452C-8053-90FEF0AFFC91}" type="datetimeFigureOut">
               <a:rPr lang="es-ES" smtClean="0"/>
-              <a:t>05/11/2022</a:t>
+              <a:t>21/11/2022</a:t>
             </a:fld>
             <a:endParaRPr lang="es-ES"/>
           </a:p>
@@ -1417,7 +1422,7 @@
           <a:p>
             <a:fld id="{68FBEF3B-CA59-452C-8053-90FEF0AFFC91}" type="datetimeFigureOut">
               <a:rPr lang="es-ES" smtClean="0"/>
-              <a:t>05/11/2022</a:t>
+              <a:t>21/11/2022</a:t>
             </a:fld>
             <a:endParaRPr lang="es-ES"/>
           </a:p>
@@ -1832,7 +1837,7 @@
           <a:p>
             <a:fld id="{68FBEF3B-CA59-452C-8053-90FEF0AFFC91}" type="datetimeFigureOut">
               <a:rPr lang="es-ES" smtClean="0"/>
-              <a:t>05/11/2022</a:t>
+              <a:t>21/11/2022</a:t>
             </a:fld>
             <a:endParaRPr lang="es-ES"/>
           </a:p>
@@ -1974,7 +1979,7 @@
           <a:p>
             <a:fld id="{68FBEF3B-CA59-452C-8053-90FEF0AFFC91}" type="datetimeFigureOut">
               <a:rPr lang="es-ES" smtClean="0"/>
-              <a:t>05/11/2022</a:t>
+              <a:t>21/11/2022</a:t>
             </a:fld>
             <a:endParaRPr lang="es-ES"/>
           </a:p>
@@ -2087,7 +2092,7 @@
           <a:p>
             <a:fld id="{68FBEF3B-CA59-452C-8053-90FEF0AFFC91}" type="datetimeFigureOut">
               <a:rPr lang="es-ES" smtClean="0"/>
-              <a:t>05/11/2022</a:t>
+              <a:t>21/11/2022</a:t>
             </a:fld>
             <a:endParaRPr lang="es-ES"/>
           </a:p>
@@ -2400,7 +2405,7 @@
           <a:p>
             <a:fld id="{68FBEF3B-CA59-452C-8053-90FEF0AFFC91}" type="datetimeFigureOut">
               <a:rPr lang="es-ES" smtClean="0"/>
-              <a:t>05/11/2022</a:t>
+              <a:t>21/11/2022</a:t>
             </a:fld>
             <a:endParaRPr lang="es-ES"/>
           </a:p>
@@ -2689,7 +2694,7 @@
           <a:p>
             <a:fld id="{68FBEF3B-CA59-452C-8053-90FEF0AFFC91}" type="datetimeFigureOut">
               <a:rPr lang="es-ES" smtClean="0"/>
-              <a:t>05/11/2022</a:t>
+              <a:t>21/11/2022</a:t>
             </a:fld>
             <a:endParaRPr lang="es-ES"/>
           </a:p>
@@ -2932,7 +2937,7 @@
           <a:p>
             <a:fld id="{68FBEF3B-CA59-452C-8053-90FEF0AFFC91}" type="datetimeFigureOut">
               <a:rPr lang="es-ES" smtClean="0"/>
-              <a:t>05/11/2022</a:t>
+              <a:t>21/11/2022</a:t>
             </a:fld>
             <a:endParaRPr lang="es-ES"/>
           </a:p>
@@ -3734,13 +3739,13 @@
           <p:nvPr/>
         </p:nvPicPr>
         <p:blipFill>
-          <a:blip r:embed="rId2">
+          <a:blip r:embed="rId2" cstate="hqprint">
             <a:extLst>
               <a:ext uri="{28A0092B-C50C-407E-A947-70E740481C1C}">
                 <a14:useLocalDpi xmlns:a14="http://schemas.microsoft.com/office/drawing/2010/main" val="0"/>
               </a:ext>
               <a:ext uri="{96DAC541-7B7A-43D3-8B79-37D633B846F1}">
-                <asvg:svgBlip xmlns:asvg="http://schemas.microsoft.com/office/drawing/2016/SVG/main" r:embed="rId3"/>
+                <asvg:svgBlip xmlns:asvg="http://schemas.microsoft.com/office/drawing/2016/SVG/main" xmlns="" r:embed="rId3"/>
               </a:ext>
             </a:extLst>
           </a:blip>
@@ -4107,13 +4112,13 @@
           <p:nvPr/>
         </p:nvPicPr>
         <p:blipFill>
-          <a:blip r:embed="rId4">
+          <a:blip r:embed="rId4" cstate="hqprint">
             <a:extLst>
               <a:ext uri="{28A0092B-C50C-407E-A947-70E740481C1C}">
                 <a14:useLocalDpi xmlns:a14="http://schemas.microsoft.com/office/drawing/2010/main" val="0"/>
               </a:ext>
               <a:ext uri="{96DAC541-7B7A-43D3-8B79-37D633B846F1}">
-                <asvg:svgBlip xmlns:asvg="http://schemas.microsoft.com/office/drawing/2016/SVG/main" r:embed="rId5"/>
+                <asvg:svgBlip xmlns:asvg="http://schemas.microsoft.com/office/drawing/2016/SVG/main" xmlns="" r:embed="rId5"/>
               </a:ext>
             </a:extLst>
           </a:blip>
@@ -4146,13 +4151,13 @@
           <p:nvPr/>
         </p:nvPicPr>
         <p:blipFill>
-          <a:blip r:embed="rId6">
+          <a:blip r:embed="rId6" cstate="hqprint">
             <a:extLst>
               <a:ext uri="{28A0092B-C50C-407E-A947-70E740481C1C}">
                 <a14:useLocalDpi xmlns:a14="http://schemas.microsoft.com/office/drawing/2010/main" val="0"/>
               </a:ext>
               <a:ext uri="{96DAC541-7B7A-43D3-8B79-37D633B846F1}">
-                <asvg:svgBlip xmlns:asvg="http://schemas.microsoft.com/office/drawing/2016/SVG/main" r:embed="rId7"/>
+                <asvg:svgBlip xmlns:asvg="http://schemas.microsoft.com/office/drawing/2016/SVG/main" xmlns="" r:embed="rId7"/>
               </a:ext>
             </a:extLst>
           </a:blip>
@@ -4185,13 +4190,13 @@
           <p:nvPr/>
         </p:nvPicPr>
         <p:blipFill>
-          <a:blip r:embed="rId8">
+          <a:blip r:embed="rId8" cstate="hqprint">
             <a:extLst>
               <a:ext uri="{28A0092B-C50C-407E-A947-70E740481C1C}">
                 <a14:useLocalDpi xmlns:a14="http://schemas.microsoft.com/office/drawing/2010/main" val="0"/>
               </a:ext>
               <a:ext uri="{96DAC541-7B7A-43D3-8B79-37D633B846F1}">
-                <asvg:svgBlip xmlns:asvg="http://schemas.microsoft.com/office/drawing/2016/SVG/main" r:embed="rId9"/>
+                <asvg:svgBlip xmlns:asvg="http://schemas.microsoft.com/office/drawing/2016/SVG/main" xmlns="" r:embed="rId9"/>
               </a:ext>
             </a:extLst>
           </a:blip>
@@ -4224,7 +4229,7 @@
           <p:nvPr/>
         </p:nvPicPr>
         <p:blipFill>
-          <a:blip r:embed="rId10">
+          <a:blip r:embed="rId10" cstate="hqprint">
             <a:extLst>
               <a:ext uri="{28A0092B-C50C-407E-A947-70E740481C1C}">
                 <a14:useLocalDpi xmlns:a14="http://schemas.microsoft.com/office/drawing/2010/main" val="0"/>
@@ -4260,7 +4265,7 @@
           <p:nvPr/>
         </p:nvPicPr>
         <p:blipFill>
-          <a:blip r:embed="rId11">
+          <a:blip r:embed="rId11" cstate="hqprint">
             <a:extLst>
               <a:ext uri="{28A0092B-C50C-407E-A947-70E740481C1C}">
                 <a14:useLocalDpi xmlns:a14="http://schemas.microsoft.com/office/drawing/2010/main" val="0"/>
@@ -4753,13 +4758,13 @@
           <p:nvPr/>
         </p:nvPicPr>
         <p:blipFill>
-          <a:blip r:embed="rId2">
+          <a:blip r:embed="rId2" cstate="hqprint">
             <a:extLst>
               <a:ext uri="{28A0092B-C50C-407E-A947-70E740481C1C}">
                 <a14:useLocalDpi xmlns:a14="http://schemas.microsoft.com/office/drawing/2010/main" val="0"/>
               </a:ext>
               <a:ext uri="{96DAC541-7B7A-43D3-8B79-37D633B846F1}">
-                <asvg:svgBlip xmlns:asvg="http://schemas.microsoft.com/office/drawing/2016/SVG/main" r:embed="rId3"/>
+                <asvg:svgBlip xmlns:asvg="http://schemas.microsoft.com/office/drawing/2016/SVG/main" xmlns="" r:embed="rId3"/>
               </a:ext>
             </a:extLst>
           </a:blip>
@@ -5126,13 +5131,13 @@
           <p:nvPr/>
         </p:nvPicPr>
         <p:blipFill>
-          <a:blip r:embed="rId4">
+          <a:blip r:embed="rId4" cstate="hqprint">
             <a:extLst>
               <a:ext uri="{28A0092B-C50C-407E-A947-70E740481C1C}">
                 <a14:useLocalDpi xmlns:a14="http://schemas.microsoft.com/office/drawing/2010/main" val="0"/>
               </a:ext>
               <a:ext uri="{96DAC541-7B7A-43D3-8B79-37D633B846F1}">
-                <asvg:svgBlip xmlns:asvg="http://schemas.microsoft.com/office/drawing/2016/SVG/main" r:embed="rId5"/>
+                <asvg:svgBlip xmlns:asvg="http://schemas.microsoft.com/office/drawing/2016/SVG/main" xmlns="" r:embed="rId5"/>
               </a:ext>
             </a:extLst>
           </a:blip>
@@ -5165,13 +5170,13 @@
           <p:nvPr/>
         </p:nvPicPr>
         <p:blipFill>
-          <a:blip r:embed="rId6">
+          <a:blip r:embed="rId6" cstate="hqprint">
             <a:extLst>
               <a:ext uri="{28A0092B-C50C-407E-A947-70E740481C1C}">
                 <a14:useLocalDpi xmlns:a14="http://schemas.microsoft.com/office/drawing/2010/main" val="0"/>
               </a:ext>
               <a:ext uri="{96DAC541-7B7A-43D3-8B79-37D633B846F1}">
-                <asvg:svgBlip xmlns:asvg="http://schemas.microsoft.com/office/drawing/2016/SVG/main" r:embed="rId7"/>
+                <asvg:svgBlip xmlns:asvg="http://schemas.microsoft.com/office/drawing/2016/SVG/main" xmlns="" r:embed="rId7"/>
               </a:ext>
             </a:extLst>
           </a:blip>
@@ -5204,13 +5209,13 @@
           <p:nvPr/>
         </p:nvPicPr>
         <p:blipFill>
-          <a:blip r:embed="rId8">
+          <a:blip r:embed="rId8" cstate="hqprint">
             <a:extLst>
               <a:ext uri="{28A0092B-C50C-407E-A947-70E740481C1C}">
                 <a14:useLocalDpi xmlns:a14="http://schemas.microsoft.com/office/drawing/2010/main" val="0"/>
               </a:ext>
               <a:ext uri="{96DAC541-7B7A-43D3-8B79-37D633B846F1}">
-                <asvg:svgBlip xmlns:asvg="http://schemas.microsoft.com/office/drawing/2016/SVG/main" r:embed="rId9"/>
+                <asvg:svgBlip xmlns:asvg="http://schemas.microsoft.com/office/drawing/2016/SVG/main" xmlns="" r:embed="rId9"/>
               </a:ext>
             </a:extLst>
           </a:blip>
@@ -5243,7 +5248,7 @@
           <p:nvPr/>
         </p:nvPicPr>
         <p:blipFill>
-          <a:blip r:embed="rId10">
+          <a:blip r:embed="rId10" cstate="hqprint">
             <a:extLst>
               <a:ext uri="{28A0092B-C50C-407E-A947-70E740481C1C}">
                 <a14:useLocalDpi xmlns:a14="http://schemas.microsoft.com/office/drawing/2010/main" val="0"/>
@@ -5279,7 +5284,7 @@
           <p:nvPr/>
         </p:nvPicPr>
         <p:blipFill>
-          <a:blip r:embed="rId11">
+          <a:blip r:embed="rId11" cstate="hqprint">
             <a:extLst>
               <a:ext uri="{28A0092B-C50C-407E-A947-70E740481C1C}">
                 <a14:useLocalDpi xmlns:a14="http://schemas.microsoft.com/office/drawing/2010/main" val="0"/>
@@ -6417,13 +6422,13 @@
           <p:nvPr/>
         </p:nvPicPr>
         <p:blipFill>
-          <a:blip r:embed="rId2">
+          <a:blip r:embed="rId2" cstate="hqprint">
             <a:extLst>
               <a:ext uri="{28A0092B-C50C-407E-A947-70E740481C1C}">
                 <a14:useLocalDpi xmlns:a14="http://schemas.microsoft.com/office/drawing/2010/main" val="0"/>
               </a:ext>
               <a:ext uri="{96DAC541-7B7A-43D3-8B79-37D633B846F1}">
-                <asvg:svgBlip xmlns:asvg="http://schemas.microsoft.com/office/drawing/2016/SVG/main" r:embed="rId3"/>
+                <asvg:svgBlip xmlns:asvg="http://schemas.microsoft.com/office/drawing/2016/SVG/main" xmlns="" r:embed="rId3"/>
               </a:ext>
             </a:extLst>
           </a:blip>
@@ -6790,13 +6795,13 @@
           <p:nvPr/>
         </p:nvPicPr>
         <p:blipFill>
-          <a:blip r:embed="rId4">
+          <a:blip r:embed="rId4" cstate="hqprint">
             <a:extLst>
               <a:ext uri="{28A0092B-C50C-407E-A947-70E740481C1C}">
                 <a14:useLocalDpi xmlns:a14="http://schemas.microsoft.com/office/drawing/2010/main" val="0"/>
               </a:ext>
               <a:ext uri="{96DAC541-7B7A-43D3-8B79-37D633B846F1}">
-                <asvg:svgBlip xmlns:asvg="http://schemas.microsoft.com/office/drawing/2016/SVG/main" r:embed="rId5"/>
+                <asvg:svgBlip xmlns:asvg="http://schemas.microsoft.com/office/drawing/2016/SVG/main" xmlns="" r:embed="rId5"/>
               </a:ext>
             </a:extLst>
           </a:blip>
@@ -6829,13 +6834,13 @@
           <p:nvPr/>
         </p:nvPicPr>
         <p:blipFill>
-          <a:blip r:embed="rId6">
+          <a:blip r:embed="rId6" cstate="hqprint">
             <a:extLst>
               <a:ext uri="{28A0092B-C50C-407E-A947-70E740481C1C}">
                 <a14:useLocalDpi xmlns:a14="http://schemas.microsoft.com/office/drawing/2010/main" val="0"/>
               </a:ext>
               <a:ext uri="{96DAC541-7B7A-43D3-8B79-37D633B846F1}">
-                <asvg:svgBlip xmlns:asvg="http://schemas.microsoft.com/office/drawing/2016/SVG/main" r:embed="rId7"/>
+                <asvg:svgBlip xmlns:asvg="http://schemas.microsoft.com/office/drawing/2016/SVG/main" xmlns="" r:embed="rId7"/>
               </a:ext>
             </a:extLst>
           </a:blip>
@@ -6868,13 +6873,13 @@
           <p:nvPr/>
         </p:nvPicPr>
         <p:blipFill>
-          <a:blip r:embed="rId8">
+          <a:blip r:embed="rId8" cstate="hqprint">
             <a:extLst>
               <a:ext uri="{28A0092B-C50C-407E-A947-70E740481C1C}">
                 <a14:useLocalDpi xmlns:a14="http://schemas.microsoft.com/office/drawing/2010/main" val="0"/>
               </a:ext>
               <a:ext uri="{96DAC541-7B7A-43D3-8B79-37D633B846F1}">
-                <asvg:svgBlip xmlns:asvg="http://schemas.microsoft.com/office/drawing/2016/SVG/main" r:embed="rId9"/>
+                <asvg:svgBlip xmlns:asvg="http://schemas.microsoft.com/office/drawing/2016/SVG/main" xmlns="" r:embed="rId9"/>
               </a:ext>
             </a:extLst>
           </a:blip>
@@ -6907,7 +6912,7 @@
           <p:nvPr/>
         </p:nvPicPr>
         <p:blipFill>
-          <a:blip r:embed="rId10">
+          <a:blip r:embed="rId10" cstate="hqprint">
             <a:extLst>
               <a:ext uri="{28A0092B-C50C-407E-A947-70E740481C1C}">
                 <a14:useLocalDpi xmlns:a14="http://schemas.microsoft.com/office/drawing/2010/main" val="0"/>
@@ -6943,7 +6948,7 @@
           <p:nvPr/>
         </p:nvPicPr>
         <p:blipFill>
-          <a:blip r:embed="rId11">
+          <a:blip r:embed="rId11" cstate="hqprint">
             <a:extLst>
               <a:ext uri="{28A0092B-C50C-407E-A947-70E740481C1C}">
                 <a14:useLocalDpi xmlns:a14="http://schemas.microsoft.com/office/drawing/2010/main" val="0"/>
@@ -8452,13 +8457,13 @@
           <p:nvPr/>
         </p:nvPicPr>
         <p:blipFill>
-          <a:blip r:embed="rId2">
+          <a:blip r:embed="rId2" cstate="hqprint">
             <a:extLst>
               <a:ext uri="{28A0092B-C50C-407E-A947-70E740481C1C}">
                 <a14:useLocalDpi xmlns:a14="http://schemas.microsoft.com/office/drawing/2010/main" val="0"/>
               </a:ext>
               <a:ext uri="{96DAC541-7B7A-43D3-8B79-37D633B846F1}">
-                <asvg:svgBlip xmlns:asvg="http://schemas.microsoft.com/office/drawing/2016/SVG/main" r:embed="rId3"/>
+                <asvg:svgBlip xmlns:asvg="http://schemas.microsoft.com/office/drawing/2016/SVG/main" xmlns="" r:embed="rId3"/>
               </a:ext>
             </a:extLst>
           </a:blip>
@@ -8825,13 +8830,13 @@
           <p:nvPr/>
         </p:nvPicPr>
         <p:blipFill>
-          <a:blip r:embed="rId4">
+          <a:blip r:embed="rId4" cstate="hqprint">
             <a:extLst>
               <a:ext uri="{28A0092B-C50C-407E-A947-70E740481C1C}">
                 <a14:useLocalDpi xmlns:a14="http://schemas.microsoft.com/office/drawing/2010/main" val="0"/>
               </a:ext>
               <a:ext uri="{96DAC541-7B7A-43D3-8B79-37D633B846F1}">
-                <asvg:svgBlip xmlns:asvg="http://schemas.microsoft.com/office/drawing/2016/SVG/main" r:embed="rId5"/>
+                <asvg:svgBlip xmlns:asvg="http://schemas.microsoft.com/office/drawing/2016/SVG/main" xmlns="" r:embed="rId5"/>
               </a:ext>
             </a:extLst>
           </a:blip>
@@ -8864,13 +8869,13 @@
           <p:nvPr/>
         </p:nvPicPr>
         <p:blipFill>
-          <a:blip r:embed="rId6">
+          <a:blip r:embed="rId6" cstate="hqprint">
             <a:extLst>
               <a:ext uri="{28A0092B-C50C-407E-A947-70E740481C1C}">
                 <a14:useLocalDpi xmlns:a14="http://schemas.microsoft.com/office/drawing/2010/main" val="0"/>
               </a:ext>
               <a:ext uri="{96DAC541-7B7A-43D3-8B79-37D633B846F1}">
-                <asvg:svgBlip xmlns:asvg="http://schemas.microsoft.com/office/drawing/2016/SVG/main" r:embed="rId7"/>
+                <asvg:svgBlip xmlns:asvg="http://schemas.microsoft.com/office/drawing/2016/SVG/main" xmlns="" r:embed="rId7"/>
               </a:ext>
             </a:extLst>
           </a:blip>
@@ -8903,13 +8908,13 @@
           <p:nvPr/>
         </p:nvPicPr>
         <p:blipFill>
-          <a:blip r:embed="rId8">
+          <a:blip r:embed="rId8" cstate="hqprint">
             <a:extLst>
               <a:ext uri="{28A0092B-C50C-407E-A947-70E740481C1C}">
                 <a14:useLocalDpi xmlns:a14="http://schemas.microsoft.com/office/drawing/2010/main" val="0"/>
               </a:ext>
               <a:ext uri="{96DAC541-7B7A-43D3-8B79-37D633B846F1}">
-                <asvg:svgBlip xmlns:asvg="http://schemas.microsoft.com/office/drawing/2016/SVG/main" r:embed="rId9"/>
+                <asvg:svgBlip xmlns:asvg="http://schemas.microsoft.com/office/drawing/2016/SVG/main" xmlns="" r:embed="rId9"/>
               </a:ext>
             </a:extLst>
           </a:blip>
@@ -8942,7 +8947,7 @@
           <p:nvPr/>
         </p:nvPicPr>
         <p:blipFill>
-          <a:blip r:embed="rId10">
+          <a:blip r:embed="rId10" cstate="hqprint">
             <a:extLst>
               <a:ext uri="{28A0092B-C50C-407E-A947-70E740481C1C}">
                 <a14:useLocalDpi xmlns:a14="http://schemas.microsoft.com/office/drawing/2010/main" val="0"/>
@@ -8978,7 +8983,7 @@
           <p:nvPr/>
         </p:nvPicPr>
         <p:blipFill>
-          <a:blip r:embed="rId11">
+          <a:blip r:embed="rId11" cstate="hqprint">
             <a:extLst>
               <a:ext uri="{28A0092B-C50C-407E-A947-70E740481C1C}">
                 <a14:useLocalDpi xmlns:a14="http://schemas.microsoft.com/office/drawing/2010/main" val="0"/>
@@ -10360,13 +10365,13 @@
           <p:nvPr/>
         </p:nvPicPr>
         <p:blipFill>
-          <a:blip r:embed="rId2">
+          <a:blip r:embed="rId2" cstate="hqprint">
             <a:extLst>
               <a:ext uri="{28A0092B-C50C-407E-A947-70E740481C1C}">
                 <a14:useLocalDpi xmlns:a14="http://schemas.microsoft.com/office/drawing/2010/main" val="0"/>
               </a:ext>
               <a:ext uri="{96DAC541-7B7A-43D3-8B79-37D633B846F1}">
-                <asvg:svgBlip xmlns:asvg="http://schemas.microsoft.com/office/drawing/2016/SVG/main" r:embed="rId3"/>
+                <asvg:svgBlip xmlns:asvg="http://schemas.microsoft.com/office/drawing/2016/SVG/main" xmlns="" r:embed="rId3"/>
               </a:ext>
             </a:extLst>
           </a:blip>
@@ -10733,13 +10738,13 @@
           <p:nvPr/>
         </p:nvPicPr>
         <p:blipFill>
-          <a:blip r:embed="rId4">
+          <a:blip r:embed="rId4" cstate="hqprint">
             <a:extLst>
               <a:ext uri="{28A0092B-C50C-407E-A947-70E740481C1C}">
                 <a14:useLocalDpi xmlns:a14="http://schemas.microsoft.com/office/drawing/2010/main" val="0"/>
               </a:ext>
               <a:ext uri="{96DAC541-7B7A-43D3-8B79-37D633B846F1}">
-                <asvg:svgBlip xmlns:asvg="http://schemas.microsoft.com/office/drawing/2016/SVG/main" r:embed="rId5"/>
+                <asvg:svgBlip xmlns:asvg="http://schemas.microsoft.com/office/drawing/2016/SVG/main" xmlns="" r:embed="rId5"/>
               </a:ext>
             </a:extLst>
           </a:blip>
@@ -10772,13 +10777,13 @@
           <p:nvPr/>
         </p:nvPicPr>
         <p:blipFill>
-          <a:blip r:embed="rId6">
+          <a:blip r:embed="rId6" cstate="hqprint">
             <a:extLst>
               <a:ext uri="{28A0092B-C50C-407E-A947-70E740481C1C}">
                 <a14:useLocalDpi xmlns:a14="http://schemas.microsoft.com/office/drawing/2010/main" val="0"/>
               </a:ext>
               <a:ext uri="{96DAC541-7B7A-43D3-8B79-37D633B846F1}">
-                <asvg:svgBlip xmlns:asvg="http://schemas.microsoft.com/office/drawing/2016/SVG/main" r:embed="rId7"/>
+                <asvg:svgBlip xmlns:asvg="http://schemas.microsoft.com/office/drawing/2016/SVG/main" xmlns="" r:embed="rId7"/>
               </a:ext>
             </a:extLst>
           </a:blip>
@@ -10811,13 +10816,13 @@
           <p:nvPr/>
         </p:nvPicPr>
         <p:blipFill>
-          <a:blip r:embed="rId8">
+          <a:blip r:embed="rId8" cstate="hqprint">
             <a:extLst>
               <a:ext uri="{28A0092B-C50C-407E-A947-70E740481C1C}">
                 <a14:useLocalDpi xmlns:a14="http://schemas.microsoft.com/office/drawing/2010/main" val="0"/>
               </a:ext>
               <a:ext uri="{96DAC541-7B7A-43D3-8B79-37D633B846F1}">
-                <asvg:svgBlip xmlns:asvg="http://schemas.microsoft.com/office/drawing/2016/SVG/main" r:embed="rId9"/>
+                <asvg:svgBlip xmlns:asvg="http://schemas.microsoft.com/office/drawing/2016/SVG/main" xmlns="" r:embed="rId9"/>
               </a:ext>
             </a:extLst>
           </a:blip>
@@ -10850,7 +10855,7 @@
           <p:nvPr/>
         </p:nvPicPr>
         <p:blipFill>
-          <a:blip r:embed="rId10">
+          <a:blip r:embed="rId10" cstate="hqprint">
             <a:extLst>
               <a:ext uri="{28A0092B-C50C-407E-A947-70E740481C1C}">
                 <a14:useLocalDpi xmlns:a14="http://schemas.microsoft.com/office/drawing/2010/main" val="0"/>
@@ -10886,7 +10891,7 @@
           <p:nvPr/>
         </p:nvPicPr>
         <p:blipFill>
-          <a:blip r:embed="rId11">
+          <a:blip r:embed="rId11" cstate="hqprint">
             <a:extLst>
               <a:ext uri="{28A0092B-C50C-407E-A947-70E740481C1C}">
                 <a14:useLocalDpi xmlns:a14="http://schemas.microsoft.com/office/drawing/2010/main" val="0"/>
@@ -12376,13 +12381,13 @@
           <p:nvPr/>
         </p:nvPicPr>
         <p:blipFill>
-          <a:blip r:embed="rId2">
+          <a:blip r:embed="rId2" cstate="hqprint">
             <a:extLst>
               <a:ext uri="{28A0092B-C50C-407E-A947-70E740481C1C}">
                 <a14:useLocalDpi xmlns:a14="http://schemas.microsoft.com/office/drawing/2010/main" val="0"/>
               </a:ext>
               <a:ext uri="{96DAC541-7B7A-43D3-8B79-37D633B846F1}">
-                <asvg:svgBlip xmlns:asvg="http://schemas.microsoft.com/office/drawing/2016/SVG/main" r:embed="rId3"/>
+                <asvg:svgBlip xmlns:asvg="http://schemas.microsoft.com/office/drawing/2016/SVG/main" xmlns="" r:embed="rId3"/>
               </a:ext>
             </a:extLst>
           </a:blip>
@@ -12749,13 +12754,13 @@
           <p:nvPr/>
         </p:nvPicPr>
         <p:blipFill>
-          <a:blip r:embed="rId4">
+          <a:blip r:embed="rId4" cstate="hqprint">
             <a:extLst>
               <a:ext uri="{28A0092B-C50C-407E-A947-70E740481C1C}">
                 <a14:useLocalDpi xmlns:a14="http://schemas.microsoft.com/office/drawing/2010/main" val="0"/>
               </a:ext>
               <a:ext uri="{96DAC541-7B7A-43D3-8B79-37D633B846F1}">
-                <asvg:svgBlip xmlns:asvg="http://schemas.microsoft.com/office/drawing/2016/SVG/main" r:embed="rId5"/>
+                <asvg:svgBlip xmlns:asvg="http://schemas.microsoft.com/office/drawing/2016/SVG/main" xmlns="" r:embed="rId5"/>
               </a:ext>
             </a:extLst>
           </a:blip>
@@ -12788,13 +12793,13 @@
           <p:nvPr/>
         </p:nvPicPr>
         <p:blipFill>
-          <a:blip r:embed="rId6">
+          <a:blip r:embed="rId6" cstate="hqprint">
             <a:extLst>
               <a:ext uri="{28A0092B-C50C-407E-A947-70E740481C1C}">
                 <a14:useLocalDpi xmlns:a14="http://schemas.microsoft.com/office/drawing/2010/main" val="0"/>
               </a:ext>
               <a:ext uri="{96DAC541-7B7A-43D3-8B79-37D633B846F1}">
-                <asvg:svgBlip xmlns:asvg="http://schemas.microsoft.com/office/drawing/2016/SVG/main" r:embed="rId7"/>
+                <asvg:svgBlip xmlns:asvg="http://schemas.microsoft.com/office/drawing/2016/SVG/main" xmlns="" r:embed="rId7"/>
               </a:ext>
             </a:extLst>
           </a:blip>
@@ -12827,13 +12832,13 @@
           <p:nvPr/>
         </p:nvPicPr>
         <p:blipFill>
-          <a:blip r:embed="rId8">
+          <a:blip r:embed="rId8" cstate="hqprint">
             <a:extLst>
               <a:ext uri="{28A0092B-C50C-407E-A947-70E740481C1C}">
                 <a14:useLocalDpi xmlns:a14="http://schemas.microsoft.com/office/drawing/2010/main" val="0"/>
               </a:ext>
               <a:ext uri="{96DAC541-7B7A-43D3-8B79-37D633B846F1}">
-                <asvg:svgBlip xmlns:asvg="http://schemas.microsoft.com/office/drawing/2016/SVG/main" r:embed="rId9"/>
+                <asvg:svgBlip xmlns:asvg="http://schemas.microsoft.com/office/drawing/2016/SVG/main" xmlns="" r:embed="rId9"/>
               </a:ext>
             </a:extLst>
           </a:blip>
@@ -12866,7 +12871,7 @@
           <p:nvPr/>
         </p:nvPicPr>
         <p:blipFill>
-          <a:blip r:embed="rId10">
+          <a:blip r:embed="rId10" cstate="hqprint">
             <a:extLst>
               <a:ext uri="{28A0092B-C50C-407E-A947-70E740481C1C}">
                 <a14:useLocalDpi xmlns:a14="http://schemas.microsoft.com/office/drawing/2010/main" val="0"/>
@@ -12902,7 +12907,7 @@
           <p:nvPr/>
         </p:nvPicPr>
         <p:blipFill>
-          <a:blip r:embed="rId11">
+          <a:blip r:embed="rId11" cstate="hqprint">
             <a:extLst>
               <a:ext uri="{28A0092B-C50C-407E-A947-70E740481C1C}">
                 <a14:useLocalDpi xmlns:a14="http://schemas.microsoft.com/office/drawing/2010/main" val="0"/>
@@ -13543,15 +13548,15 @@
             </a:r>
             <a:r>
               <a:rPr lang="es-ES" sz="1100" dirty="0"/>
-              <a:t> ROIC): Total </a:t>
-            </a:r>
-            <a:r>
-              <a:rPr lang="es-ES" sz="1100" dirty="0" err="1"/>
-              <a:t>of</a:t>
-            </a:r>
-            <a:r>
-              <a:rPr lang="es-ES" sz="1100" dirty="0"/>
-              <a:t> 6 bar charts.</a:t>
+              <a:t> </a:t>
+            </a:r>
+            <a:r>
+              <a:rPr lang="es-ES" sz="1100" dirty="0" smtClean="0"/>
+              <a:t>ROIC, WACC): </a:t>
+            </a:r>
+            <a:r>
+              <a:rPr lang="es-ES" sz="1100" dirty="0"/>
+              <a:t>Total of 6 bar charts.</a:t>
             </a:r>
           </a:p>
         </p:txBody>
@@ -14243,13 +14248,13 @@
           <p:nvPr/>
         </p:nvPicPr>
         <p:blipFill>
-          <a:blip r:embed="rId2">
+          <a:blip r:embed="rId2" cstate="hqprint">
             <a:extLst>
               <a:ext uri="{28A0092B-C50C-407E-A947-70E740481C1C}">
                 <a14:useLocalDpi xmlns:a14="http://schemas.microsoft.com/office/drawing/2010/main" val="0"/>
               </a:ext>
               <a:ext uri="{96DAC541-7B7A-43D3-8B79-37D633B846F1}">
-                <asvg:svgBlip xmlns:asvg="http://schemas.microsoft.com/office/drawing/2016/SVG/main" r:embed="rId3"/>
+                <asvg:svgBlip xmlns:asvg="http://schemas.microsoft.com/office/drawing/2016/SVG/main" xmlns="" r:embed="rId3"/>
               </a:ext>
             </a:extLst>
           </a:blip>
@@ -14616,13 +14621,13 @@
           <p:nvPr/>
         </p:nvPicPr>
         <p:blipFill>
-          <a:blip r:embed="rId4">
+          <a:blip r:embed="rId4" cstate="hqprint">
             <a:extLst>
               <a:ext uri="{28A0092B-C50C-407E-A947-70E740481C1C}">
                 <a14:useLocalDpi xmlns:a14="http://schemas.microsoft.com/office/drawing/2010/main" val="0"/>
               </a:ext>
               <a:ext uri="{96DAC541-7B7A-43D3-8B79-37D633B846F1}">
-                <asvg:svgBlip xmlns:asvg="http://schemas.microsoft.com/office/drawing/2016/SVG/main" r:embed="rId5"/>
+                <asvg:svgBlip xmlns:asvg="http://schemas.microsoft.com/office/drawing/2016/SVG/main" xmlns="" r:embed="rId5"/>
               </a:ext>
             </a:extLst>
           </a:blip>
@@ -14655,13 +14660,13 @@
           <p:nvPr/>
         </p:nvPicPr>
         <p:blipFill>
-          <a:blip r:embed="rId6">
+          <a:blip r:embed="rId6" cstate="hqprint">
             <a:extLst>
               <a:ext uri="{28A0092B-C50C-407E-A947-70E740481C1C}">
                 <a14:useLocalDpi xmlns:a14="http://schemas.microsoft.com/office/drawing/2010/main" val="0"/>
               </a:ext>
               <a:ext uri="{96DAC541-7B7A-43D3-8B79-37D633B846F1}">
-                <asvg:svgBlip xmlns:asvg="http://schemas.microsoft.com/office/drawing/2016/SVG/main" r:embed="rId7"/>
+                <asvg:svgBlip xmlns:asvg="http://schemas.microsoft.com/office/drawing/2016/SVG/main" xmlns="" r:embed="rId7"/>
               </a:ext>
             </a:extLst>
           </a:blip>
@@ -14694,13 +14699,13 @@
           <p:nvPr/>
         </p:nvPicPr>
         <p:blipFill>
-          <a:blip r:embed="rId8">
+          <a:blip r:embed="rId8" cstate="hqprint">
             <a:extLst>
               <a:ext uri="{28A0092B-C50C-407E-A947-70E740481C1C}">
                 <a14:useLocalDpi xmlns:a14="http://schemas.microsoft.com/office/drawing/2010/main" val="0"/>
               </a:ext>
               <a:ext uri="{96DAC541-7B7A-43D3-8B79-37D633B846F1}">
-                <asvg:svgBlip xmlns:asvg="http://schemas.microsoft.com/office/drawing/2016/SVG/main" r:embed="rId9"/>
+                <asvg:svgBlip xmlns:asvg="http://schemas.microsoft.com/office/drawing/2016/SVG/main" xmlns="" r:embed="rId9"/>
               </a:ext>
             </a:extLst>
           </a:blip>
@@ -14733,7 +14738,7 @@
           <p:nvPr/>
         </p:nvPicPr>
         <p:blipFill>
-          <a:blip r:embed="rId10">
+          <a:blip r:embed="rId10" cstate="hqprint">
             <a:extLst>
               <a:ext uri="{28A0092B-C50C-407E-A947-70E740481C1C}">
                 <a14:useLocalDpi xmlns:a14="http://schemas.microsoft.com/office/drawing/2010/main" val="0"/>
@@ -14769,7 +14774,7 @@
           <p:nvPr/>
         </p:nvPicPr>
         <p:blipFill>
-          <a:blip r:embed="rId11">
+          <a:blip r:embed="rId11" cstate="hqprint">
             <a:extLst>
               <a:ext uri="{28A0092B-C50C-407E-A947-70E740481C1C}">
                 <a14:useLocalDpi xmlns:a14="http://schemas.microsoft.com/office/drawing/2010/main" val="0"/>
@@ -16052,13 +16057,13 @@
           <p:nvPr/>
         </p:nvPicPr>
         <p:blipFill>
-          <a:blip r:embed="rId2">
+          <a:blip r:embed="rId2" cstate="hqprint">
             <a:extLst>
               <a:ext uri="{28A0092B-C50C-407E-A947-70E740481C1C}">
                 <a14:useLocalDpi xmlns:a14="http://schemas.microsoft.com/office/drawing/2010/main" val="0"/>
               </a:ext>
               <a:ext uri="{96DAC541-7B7A-43D3-8B79-37D633B846F1}">
-                <asvg:svgBlip xmlns:asvg="http://schemas.microsoft.com/office/drawing/2016/SVG/main" r:embed="rId3"/>
+                <asvg:svgBlip xmlns:asvg="http://schemas.microsoft.com/office/drawing/2016/SVG/main" xmlns="" r:embed="rId3"/>
               </a:ext>
             </a:extLst>
           </a:blip>
@@ -16425,13 +16430,13 @@
           <p:nvPr/>
         </p:nvPicPr>
         <p:blipFill>
-          <a:blip r:embed="rId4">
+          <a:blip r:embed="rId4" cstate="hqprint">
             <a:extLst>
               <a:ext uri="{28A0092B-C50C-407E-A947-70E740481C1C}">
                 <a14:useLocalDpi xmlns:a14="http://schemas.microsoft.com/office/drawing/2010/main" val="0"/>
               </a:ext>
               <a:ext uri="{96DAC541-7B7A-43D3-8B79-37D633B846F1}">
-                <asvg:svgBlip xmlns:asvg="http://schemas.microsoft.com/office/drawing/2016/SVG/main" r:embed="rId5"/>
+                <asvg:svgBlip xmlns:asvg="http://schemas.microsoft.com/office/drawing/2016/SVG/main" xmlns="" r:embed="rId5"/>
               </a:ext>
             </a:extLst>
           </a:blip>
@@ -16464,13 +16469,13 @@
           <p:nvPr/>
         </p:nvPicPr>
         <p:blipFill>
-          <a:blip r:embed="rId6">
+          <a:blip r:embed="rId6" cstate="hqprint">
             <a:extLst>
               <a:ext uri="{28A0092B-C50C-407E-A947-70E740481C1C}">
                 <a14:useLocalDpi xmlns:a14="http://schemas.microsoft.com/office/drawing/2010/main" val="0"/>
               </a:ext>
               <a:ext uri="{96DAC541-7B7A-43D3-8B79-37D633B846F1}">
-                <asvg:svgBlip xmlns:asvg="http://schemas.microsoft.com/office/drawing/2016/SVG/main" r:embed="rId7"/>
+                <asvg:svgBlip xmlns:asvg="http://schemas.microsoft.com/office/drawing/2016/SVG/main" xmlns="" r:embed="rId7"/>
               </a:ext>
             </a:extLst>
           </a:blip>
@@ -16503,13 +16508,13 @@
           <p:nvPr/>
         </p:nvPicPr>
         <p:blipFill>
-          <a:blip r:embed="rId8">
+          <a:blip r:embed="rId8" cstate="hqprint">
             <a:extLst>
               <a:ext uri="{28A0092B-C50C-407E-A947-70E740481C1C}">
                 <a14:useLocalDpi xmlns:a14="http://schemas.microsoft.com/office/drawing/2010/main" val="0"/>
               </a:ext>
               <a:ext uri="{96DAC541-7B7A-43D3-8B79-37D633B846F1}">
-                <asvg:svgBlip xmlns:asvg="http://schemas.microsoft.com/office/drawing/2016/SVG/main" r:embed="rId9"/>
+                <asvg:svgBlip xmlns:asvg="http://schemas.microsoft.com/office/drawing/2016/SVG/main" xmlns="" r:embed="rId9"/>
               </a:ext>
             </a:extLst>
           </a:blip>
@@ -16542,7 +16547,7 @@
           <p:nvPr/>
         </p:nvPicPr>
         <p:blipFill>
-          <a:blip r:embed="rId10">
+          <a:blip r:embed="rId10" cstate="hqprint">
             <a:extLst>
               <a:ext uri="{28A0092B-C50C-407E-A947-70E740481C1C}">
                 <a14:useLocalDpi xmlns:a14="http://schemas.microsoft.com/office/drawing/2010/main" val="0"/>
@@ -16578,7 +16583,7 @@
           <p:nvPr/>
         </p:nvPicPr>
         <p:blipFill>
-          <a:blip r:embed="rId11">
+          <a:blip r:embed="rId11" cstate="hqprint">
             <a:extLst>
               <a:ext uri="{28A0092B-C50C-407E-A947-70E740481C1C}">
                 <a14:useLocalDpi xmlns:a14="http://schemas.microsoft.com/office/drawing/2010/main" val="0"/>

</xml_diff>